<commit_message>
Update What is new with ABP 7.2 RC.1.pptx
</commit_message>
<xml_diff>
--- a/2023-04-16 ABP Community Talks 2023.3/What is new with ABP 7.2 RC.1.pptx
+++ b/2023-04-16 ABP Community Talks 2023.3/What is new with ABP 7.2 RC.1.pptx
@@ -266,7 +266,7 @@
           <a:p>
             <a:fld id="{2A14C9FE-EBC3-45D3-899C-58AAF4F8AF71}" type="datetimeFigureOut">
               <a:rPr lang="en-US" smtClean="0"/>
-              <a:t>4/16/2023</a:t>
+              <a:t>4/17/2023</a:t>
             </a:fld>
             <a:endParaRPr lang="en-US"/>
           </a:p>
@@ -464,7 +464,7 @@
           <a:p>
             <a:fld id="{2A14C9FE-EBC3-45D3-899C-58AAF4F8AF71}" type="datetimeFigureOut">
               <a:rPr lang="en-US" smtClean="0"/>
-              <a:t>4/16/2023</a:t>
+              <a:t>4/17/2023</a:t>
             </a:fld>
             <a:endParaRPr lang="en-US"/>
           </a:p>
@@ -672,7 +672,7 @@
           <a:p>
             <a:fld id="{2A14C9FE-EBC3-45D3-899C-58AAF4F8AF71}" type="datetimeFigureOut">
               <a:rPr lang="en-US" smtClean="0"/>
-              <a:t>4/16/2023</a:t>
+              <a:t>4/17/2023</a:t>
             </a:fld>
             <a:endParaRPr lang="en-US"/>
           </a:p>
@@ -870,7 +870,7 @@
           <a:p>
             <a:fld id="{2A14C9FE-EBC3-45D3-899C-58AAF4F8AF71}" type="datetimeFigureOut">
               <a:rPr lang="en-US" smtClean="0"/>
-              <a:t>4/16/2023</a:t>
+              <a:t>4/17/2023</a:t>
             </a:fld>
             <a:endParaRPr lang="en-US"/>
           </a:p>
@@ -1145,7 +1145,7 @@
           <a:p>
             <a:fld id="{2A14C9FE-EBC3-45D3-899C-58AAF4F8AF71}" type="datetimeFigureOut">
               <a:rPr lang="en-US" smtClean="0"/>
-              <a:t>4/16/2023</a:t>
+              <a:t>4/17/2023</a:t>
             </a:fld>
             <a:endParaRPr lang="en-US"/>
           </a:p>
@@ -1410,7 +1410,7 @@
           <a:p>
             <a:fld id="{2A14C9FE-EBC3-45D3-899C-58AAF4F8AF71}" type="datetimeFigureOut">
               <a:rPr lang="en-US" smtClean="0"/>
-              <a:t>4/16/2023</a:t>
+              <a:t>4/17/2023</a:t>
             </a:fld>
             <a:endParaRPr lang="en-US"/>
           </a:p>
@@ -1822,7 +1822,7 @@
           <a:p>
             <a:fld id="{2A14C9FE-EBC3-45D3-899C-58AAF4F8AF71}" type="datetimeFigureOut">
               <a:rPr lang="en-US" smtClean="0"/>
-              <a:t>4/16/2023</a:t>
+              <a:t>4/17/2023</a:t>
             </a:fld>
             <a:endParaRPr lang="en-US"/>
           </a:p>
@@ -1963,7 +1963,7 @@
           <a:p>
             <a:fld id="{2A14C9FE-EBC3-45D3-899C-58AAF4F8AF71}" type="datetimeFigureOut">
               <a:rPr lang="en-US" smtClean="0"/>
-              <a:t>4/16/2023</a:t>
+              <a:t>4/17/2023</a:t>
             </a:fld>
             <a:endParaRPr lang="en-US"/>
           </a:p>
@@ -2076,7 +2076,7 @@
           <a:p>
             <a:fld id="{2A14C9FE-EBC3-45D3-899C-58AAF4F8AF71}" type="datetimeFigureOut">
               <a:rPr lang="en-US" smtClean="0"/>
-              <a:t>4/16/2023</a:t>
+              <a:t>4/17/2023</a:t>
             </a:fld>
             <a:endParaRPr lang="en-US"/>
           </a:p>
@@ -2387,7 +2387,7 @@
           <a:p>
             <a:fld id="{2A14C9FE-EBC3-45D3-899C-58AAF4F8AF71}" type="datetimeFigureOut">
               <a:rPr lang="en-US" smtClean="0"/>
-              <a:t>4/16/2023</a:t>
+              <a:t>4/17/2023</a:t>
             </a:fld>
             <a:endParaRPr lang="en-US"/>
           </a:p>
@@ -2675,7 +2675,7 @@
           <a:p>
             <a:fld id="{2A14C9FE-EBC3-45D3-899C-58AAF4F8AF71}" type="datetimeFigureOut">
               <a:rPr lang="en-US" smtClean="0"/>
-              <a:t>4/16/2023</a:t>
+              <a:t>4/17/2023</a:t>
             </a:fld>
             <a:endParaRPr lang="en-US"/>
           </a:p>
@@ -2916,7 +2916,7 @@
           <a:p>
             <a:fld id="{2A14C9FE-EBC3-45D3-899C-58AAF4F8AF71}" type="datetimeFigureOut">
               <a:rPr lang="en-US" smtClean="0"/>
-              <a:t>4/16/2023</a:t>
+              <a:t>4/17/2023</a:t>
             </a:fld>
             <a:endParaRPr lang="en-US"/>
           </a:p>
@@ -3572,7 +3572,7 @@
         </p:nvSpPr>
         <p:spPr>
           <a:xfrm>
-            <a:off x="1492875" y="2834293"/>
+            <a:off x="1492875" y="3120538"/>
             <a:ext cx="4534293" cy="2033444"/>
           </a:xfrm>
         </p:spPr>
@@ -3652,7 +3652,7 @@
         </p:blipFill>
         <p:spPr bwMode="auto">
           <a:xfrm>
-            <a:off x="799221" y="2799537"/>
+            <a:off x="799221" y="3085782"/>
             <a:ext cx="597405" cy="597405"/>
           </a:xfrm>
           <a:prstGeom prst="rect">
@@ -3699,7 +3699,7 @@
         </p:blipFill>
         <p:spPr bwMode="auto">
           <a:xfrm>
-            <a:off x="798161" y="3318279"/>
+            <a:off x="798161" y="3604524"/>
             <a:ext cx="603316" cy="689321"/>
           </a:xfrm>
           <a:prstGeom prst="rect">
@@ -3745,7 +3745,7 @@
         </p:blipFill>
         <p:spPr>
           <a:xfrm>
-            <a:off x="793311" y="3918600"/>
+            <a:off x="793311" y="4204845"/>
             <a:ext cx="603316" cy="603316"/>
           </a:xfrm>
           <a:prstGeom prst="rect">
@@ -3755,10 +3755,10 @@
       </p:pic>
       <p:sp>
         <p:nvSpPr>
-          <p:cNvPr id="6" name="Content Placeholder 2">
-            <a:extLst>
-              <a:ext uri="{FF2B5EF4-FFF2-40B4-BE49-F238E27FC236}">
-                <a16:creationId xmlns:a16="http://schemas.microsoft.com/office/drawing/2014/main" id="{D018472C-7C6F-6E0A-A913-1C256FC42304}"/>
+          <p:cNvPr id="7" name="Content Placeholder 2">
+            <a:extLst>
+              <a:ext uri="{FF2B5EF4-FFF2-40B4-BE49-F238E27FC236}">
+                <a16:creationId xmlns:a16="http://schemas.microsoft.com/office/drawing/2014/main" id="{B649A795-E37B-1CCE-6E25-1EB596CD1F9B}"/>
               </a:ext>
             </a:extLst>
           </p:cNvPr>
@@ -3769,8 +3769,8 @@
         </p:nvSpPr>
         <p:spPr>
           <a:xfrm>
-            <a:off x="1492875" y="1968394"/>
-            <a:ext cx="4534293" cy="592778"/>
+            <a:off x="7101726" y="3120538"/>
+            <a:ext cx="4534293" cy="2033444"/>
           </a:xfrm>
           <a:prstGeom prst="rect">
             <a:avLst/>
@@ -3950,216 +3950,6 @@
               <a:buNone/>
             </a:pPr>
             <a:r>
-              <a:rPr lang="tr-TR" sz="3200" b="1" u="sng">
-                <a:latin typeface="Euclid Circular B" panose="020B0504000000000000" pitchFamily="34" charset="0"/>
-                <a:ea typeface="Euclid Circular B" panose="020B0504000000000000" pitchFamily="34" charset="0"/>
-              </a:rPr>
-              <a:t>ABP FRAMEWORK</a:t>
-            </a:r>
-            <a:endParaRPr lang="en-US" sz="3200" b="1" u="sng" dirty="0">
-              <a:latin typeface="Euclid Circular B" panose="020B0504000000000000" pitchFamily="34" charset="0"/>
-              <a:ea typeface="Euclid Circular B" panose="020B0504000000000000" pitchFamily="34" charset="0"/>
-            </a:endParaRPr>
-          </a:p>
-        </p:txBody>
-      </p:sp>
-      <p:sp>
-        <p:nvSpPr>
-          <p:cNvPr id="7" name="Content Placeholder 2">
-            <a:extLst>
-              <a:ext uri="{FF2B5EF4-FFF2-40B4-BE49-F238E27FC236}">
-                <a16:creationId xmlns:a16="http://schemas.microsoft.com/office/drawing/2014/main" id="{B649A795-E37B-1CCE-6E25-1EB596CD1F9B}"/>
-              </a:ext>
-            </a:extLst>
-          </p:cNvPr>
-          <p:cNvSpPr txBox="1">
-            <a:spLocks/>
-          </p:cNvSpPr>
-          <p:nvPr/>
-        </p:nvSpPr>
-        <p:spPr>
-          <a:xfrm>
-            <a:off x="7101726" y="2834293"/>
-            <a:ext cx="4534293" cy="2033444"/>
-          </a:xfrm>
-          <a:prstGeom prst="rect">
-            <a:avLst/>
-          </a:prstGeom>
-        </p:spPr>
-        <p:txBody>
-          <a:bodyPr vert="horz" lIns="91440" tIns="45720" rIns="91440" bIns="45720" rtlCol="0">
-            <a:normAutofit/>
-          </a:bodyPr>
-          <a:lstStyle>
-            <a:lvl1pPr marL="228600" indent="-228600" algn="l" defTabSz="914400" rtl="0" eaLnBrk="1" latinLnBrk="0" hangingPunct="1">
-              <a:lnSpc>
-                <a:spcPct val="90000"/>
-              </a:lnSpc>
-              <a:spcBef>
-                <a:spcPts val="1000"/>
-              </a:spcBef>
-              <a:buFont typeface="Arial" panose="020B0604020202020204" pitchFamily="34" charset="0"/>
-              <a:buChar char="•"/>
-              <a:defRPr sz="2800" kern="1200">
-                <a:solidFill>
-                  <a:schemeClr val="tx1"/>
-                </a:solidFill>
-                <a:latin typeface="+mn-lt"/>
-                <a:ea typeface="+mn-ea"/>
-                <a:cs typeface="+mn-cs"/>
-              </a:defRPr>
-            </a:lvl1pPr>
-            <a:lvl2pPr marL="685800" indent="-228600" algn="l" defTabSz="914400" rtl="0" eaLnBrk="1" latinLnBrk="0" hangingPunct="1">
-              <a:lnSpc>
-                <a:spcPct val="90000"/>
-              </a:lnSpc>
-              <a:spcBef>
-                <a:spcPts val="500"/>
-              </a:spcBef>
-              <a:buFont typeface="Arial" panose="020B0604020202020204" pitchFamily="34" charset="0"/>
-              <a:buChar char="•"/>
-              <a:defRPr sz="2400" kern="1200">
-                <a:solidFill>
-                  <a:schemeClr val="tx1"/>
-                </a:solidFill>
-                <a:latin typeface="+mn-lt"/>
-                <a:ea typeface="+mn-ea"/>
-                <a:cs typeface="+mn-cs"/>
-              </a:defRPr>
-            </a:lvl2pPr>
-            <a:lvl3pPr marL="1143000" indent="-228600" algn="l" defTabSz="914400" rtl="0" eaLnBrk="1" latinLnBrk="0" hangingPunct="1">
-              <a:lnSpc>
-                <a:spcPct val="90000"/>
-              </a:lnSpc>
-              <a:spcBef>
-                <a:spcPts val="500"/>
-              </a:spcBef>
-              <a:buFont typeface="Arial" panose="020B0604020202020204" pitchFamily="34" charset="0"/>
-              <a:buChar char="•"/>
-              <a:defRPr sz="2000" kern="1200">
-                <a:solidFill>
-                  <a:schemeClr val="tx1"/>
-                </a:solidFill>
-                <a:latin typeface="+mn-lt"/>
-                <a:ea typeface="+mn-ea"/>
-                <a:cs typeface="+mn-cs"/>
-              </a:defRPr>
-            </a:lvl3pPr>
-            <a:lvl4pPr marL="1600200" indent="-228600" algn="l" defTabSz="914400" rtl="0" eaLnBrk="1" latinLnBrk="0" hangingPunct="1">
-              <a:lnSpc>
-                <a:spcPct val="90000"/>
-              </a:lnSpc>
-              <a:spcBef>
-                <a:spcPts val="500"/>
-              </a:spcBef>
-              <a:buFont typeface="Arial" panose="020B0604020202020204" pitchFamily="34" charset="0"/>
-              <a:buChar char="•"/>
-              <a:defRPr sz="1800" kern="1200">
-                <a:solidFill>
-                  <a:schemeClr val="tx1"/>
-                </a:solidFill>
-                <a:latin typeface="+mn-lt"/>
-                <a:ea typeface="+mn-ea"/>
-                <a:cs typeface="+mn-cs"/>
-              </a:defRPr>
-            </a:lvl4pPr>
-            <a:lvl5pPr marL="2057400" indent="-228600" algn="l" defTabSz="914400" rtl="0" eaLnBrk="1" latinLnBrk="0" hangingPunct="1">
-              <a:lnSpc>
-                <a:spcPct val="90000"/>
-              </a:lnSpc>
-              <a:spcBef>
-                <a:spcPts val="500"/>
-              </a:spcBef>
-              <a:buFont typeface="Arial" panose="020B0604020202020204" pitchFamily="34" charset="0"/>
-              <a:buChar char="•"/>
-              <a:defRPr sz="1800" kern="1200">
-                <a:solidFill>
-                  <a:schemeClr val="tx1"/>
-                </a:solidFill>
-                <a:latin typeface="+mn-lt"/>
-                <a:ea typeface="+mn-ea"/>
-                <a:cs typeface="+mn-cs"/>
-              </a:defRPr>
-            </a:lvl5pPr>
-            <a:lvl6pPr marL="2514600" indent="-228600" algn="l" defTabSz="914400" rtl="0" eaLnBrk="1" latinLnBrk="0" hangingPunct="1">
-              <a:lnSpc>
-                <a:spcPct val="90000"/>
-              </a:lnSpc>
-              <a:spcBef>
-                <a:spcPts val="500"/>
-              </a:spcBef>
-              <a:buFont typeface="Arial" panose="020B0604020202020204" pitchFamily="34" charset="0"/>
-              <a:buChar char="•"/>
-              <a:defRPr sz="1800" kern="1200">
-                <a:solidFill>
-                  <a:schemeClr val="tx1"/>
-                </a:solidFill>
-                <a:latin typeface="+mn-lt"/>
-                <a:ea typeface="+mn-ea"/>
-                <a:cs typeface="+mn-cs"/>
-              </a:defRPr>
-            </a:lvl6pPr>
-            <a:lvl7pPr marL="2971800" indent="-228600" algn="l" defTabSz="914400" rtl="0" eaLnBrk="1" latinLnBrk="0" hangingPunct="1">
-              <a:lnSpc>
-                <a:spcPct val="90000"/>
-              </a:lnSpc>
-              <a:spcBef>
-                <a:spcPts val="500"/>
-              </a:spcBef>
-              <a:buFont typeface="Arial" panose="020B0604020202020204" pitchFamily="34" charset="0"/>
-              <a:buChar char="•"/>
-              <a:defRPr sz="1800" kern="1200">
-                <a:solidFill>
-                  <a:schemeClr val="tx1"/>
-                </a:solidFill>
-                <a:latin typeface="+mn-lt"/>
-                <a:ea typeface="+mn-ea"/>
-                <a:cs typeface="+mn-cs"/>
-              </a:defRPr>
-            </a:lvl7pPr>
-            <a:lvl8pPr marL="3429000" indent="-228600" algn="l" defTabSz="914400" rtl="0" eaLnBrk="1" latinLnBrk="0" hangingPunct="1">
-              <a:lnSpc>
-                <a:spcPct val="90000"/>
-              </a:lnSpc>
-              <a:spcBef>
-                <a:spcPts val="500"/>
-              </a:spcBef>
-              <a:buFont typeface="Arial" panose="020B0604020202020204" pitchFamily="34" charset="0"/>
-              <a:buChar char="•"/>
-              <a:defRPr sz="1800" kern="1200">
-                <a:solidFill>
-                  <a:schemeClr val="tx1"/>
-                </a:solidFill>
-                <a:latin typeface="+mn-lt"/>
-                <a:ea typeface="+mn-ea"/>
-                <a:cs typeface="+mn-cs"/>
-              </a:defRPr>
-            </a:lvl8pPr>
-            <a:lvl9pPr marL="3886200" indent="-228600" algn="l" defTabSz="914400" rtl="0" eaLnBrk="1" latinLnBrk="0" hangingPunct="1">
-              <a:lnSpc>
-                <a:spcPct val="90000"/>
-              </a:lnSpc>
-              <a:spcBef>
-                <a:spcPts val="500"/>
-              </a:spcBef>
-              <a:buFont typeface="Arial" panose="020B0604020202020204" pitchFamily="34" charset="0"/>
-              <a:buChar char="•"/>
-              <a:defRPr sz="1800" kern="1200">
-                <a:solidFill>
-                  <a:schemeClr val="tx1"/>
-                </a:solidFill>
-                <a:latin typeface="+mn-lt"/>
-                <a:ea typeface="+mn-ea"/>
-                <a:cs typeface="+mn-cs"/>
-              </a:defRPr>
-            </a:lvl9pPr>
-          </a:lstStyle>
-          <a:p>
-            <a:pPr marL="0" indent="0">
-              <a:buFont typeface="Arial" panose="020B0604020202020204" pitchFamily="34" charset="0"/>
-              <a:buNone/>
-            </a:pPr>
-            <a:r>
               <a:rPr lang="tr-TR" sz="3200">
                 <a:latin typeface="Euclid Circular B" panose="020B0504000000000000" pitchFamily="34" charset="0"/>
                 <a:ea typeface="Euclid Circular B" panose="020B0504000000000000" pitchFamily="34" charset="0"/>
@@ -4228,7 +4018,7 @@
         </p:blipFill>
         <p:spPr bwMode="auto">
           <a:xfrm>
-            <a:off x="6408072" y="2799537"/>
+            <a:off x="6408072" y="3085782"/>
             <a:ext cx="597405" cy="597405"/>
           </a:xfrm>
           <a:prstGeom prst="rect">
@@ -4275,7 +4065,7 @@
         </p:blipFill>
         <p:spPr bwMode="auto">
           <a:xfrm>
-            <a:off x="6407012" y="3318279"/>
+            <a:off x="6407012" y="3604524"/>
             <a:ext cx="603316" cy="689321"/>
           </a:xfrm>
           <a:prstGeom prst="rect">
@@ -4321,7 +4111,7 @@
         </p:blipFill>
         <p:spPr>
           <a:xfrm>
-            <a:off x="6402162" y="3918600"/>
+            <a:off x="6402162" y="4204845"/>
             <a:ext cx="603316" cy="603316"/>
           </a:xfrm>
           <a:prstGeom prst="rect">
@@ -4329,216 +4119,92 @@
           </a:prstGeom>
         </p:spPr>
       </p:pic>
-      <p:sp>
-        <p:nvSpPr>
-          <p:cNvPr id="11" name="Content Placeholder 2">
-            <a:extLst>
-              <a:ext uri="{FF2B5EF4-FFF2-40B4-BE49-F238E27FC236}">
-                <a16:creationId xmlns:a16="http://schemas.microsoft.com/office/drawing/2014/main" id="{C74B5CE3-81B2-D379-C47D-9614D94DCE93}"/>
-              </a:ext>
-            </a:extLst>
-          </p:cNvPr>
-          <p:cNvSpPr txBox="1">
-            <a:spLocks/>
-          </p:cNvSpPr>
+      <p:pic>
+        <p:nvPicPr>
+          <p:cNvPr id="12" name="Picture 11" descr="Text&#10;&#10;Description automatically generated">
+            <a:extLst>
+              <a:ext uri="{FF2B5EF4-FFF2-40B4-BE49-F238E27FC236}">
+                <a16:creationId xmlns:a16="http://schemas.microsoft.com/office/drawing/2014/main" id="{B8E728C7-EA99-E132-2304-E1FEB3823FE4}"/>
+              </a:ext>
+            </a:extLst>
+          </p:cNvPr>
+          <p:cNvPicPr>
+            <a:picLocks noChangeAspect="1"/>
+          </p:cNvPicPr>
           <p:nvPr/>
-        </p:nvSpPr>
+        </p:nvPicPr>
+        <p:blipFill>
+          <a:blip r:embed="rId6">
+            <a:extLst>
+              <a:ext uri="{28A0092B-C50C-407E-A947-70E740481C1C}">
+                <a14:useLocalDpi xmlns:a14="http://schemas.microsoft.com/office/drawing/2010/main" val="0"/>
+              </a:ext>
+            </a:extLst>
+          </a:blip>
+          <a:stretch>
+            <a:fillRect/>
+          </a:stretch>
+        </p:blipFill>
         <p:spPr>
           <a:xfrm>
-            <a:off x="7101726" y="1968394"/>
-            <a:ext cx="4534293" cy="592778"/>
+            <a:off x="793311" y="2123091"/>
+            <a:ext cx="4381169" cy="615715"/>
           </a:xfrm>
           <a:prstGeom prst="rect">
             <a:avLst/>
           </a:prstGeom>
+          <a:effectLst>
+            <a:outerShdw blurRad="50800" dist="38100" dir="2700000" algn="tl" rotWithShape="0">
+              <a:srgbClr val="7030A0">
+                <a:alpha val="40000"/>
+              </a:srgbClr>
+            </a:outerShdw>
+          </a:effectLst>
         </p:spPr>
-        <p:txBody>
-          <a:bodyPr vert="horz" lIns="91440" tIns="45720" rIns="91440" bIns="45720" rtlCol="0">
-            <a:normAutofit/>
-          </a:bodyPr>
-          <a:lstStyle>
-            <a:lvl1pPr marL="228600" indent="-228600" algn="l" defTabSz="914400" rtl="0" eaLnBrk="1" latinLnBrk="0" hangingPunct="1">
-              <a:lnSpc>
-                <a:spcPct val="90000"/>
-              </a:lnSpc>
-              <a:spcBef>
-                <a:spcPts val="1000"/>
-              </a:spcBef>
-              <a:buFont typeface="Arial" panose="020B0604020202020204" pitchFamily="34" charset="0"/>
-              <a:buChar char="•"/>
-              <a:defRPr sz="2800" kern="1200">
-                <a:solidFill>
-                  <a:schemeClr val="tx1"/>
-                </a:solidFill>
-                <a:latin typeface="+mn-lt"/>
-                <a:ea typeface="+mn-ea"/>
-                <a:cs typeface="+mn-cs"/>
-              </a:defRPr>
-            </a:lvl1pPr>
-            <a:lvl2pPr marL="685800" indent="-228600" algn="l" defTabSz="914400" rtl="0" eaLnBrk="1" latinLnBrk="0" hangingPunct="1">
-              <a:lnSpc>
-                <a:spcPct val="90000"/>
-              </a:lnSpc>
-              <a:spcBef>
-                <a:spcPts val="500"/>
-              </a:spcBef>
-              <a:buFont typeface="Arial" panose="020B0604020202020204" pitchFamily="34" charset="0"/>
-              <a:buChar char="•"/>
-              <a:defRPr sz="2400" kern="1200">
-                <a:solidFill>
-                  <a:schemeClr val="tx1"/>
-                </a:solidFill>
-                <a:latin typeface="+mn-lt"/>
-                <a:ea typeface="+mn-ea"/>
-                <a:cs typeface="+mn-cs"/>
-              </a:defRPr>
-            </a:lvl2pPr>
-            <a:lvl3pPr marL="1143000" indent="-228600" algn="l" defTabSz="914400" rtl="0" eaLnBrk="1" latinLnBrk="0" hangingPunct="1">
-              <a:lnSpc>
-                <a:spcPct val="90000"/>
-              </a:lnSpc>
-              <a:spcBef>
-                <a:spcPts val="500"/>
-              </a:spcBef>
-              <a:buFont typeface="Arial" panose="020B0604020202020204" pitchFamily="34" charset="0"/>
-              <a:buChar char="•"/>
-              <a:defRPr sz="2000" kern="1200">
-                <a:solidFill>
-                  <a:schemeClr val="tx1"/>
-                </a:solidFill>
-                <a:latin typeface="+mn-lt"/>
-                <a:ea typeface="+mn-ea"/>
-                <a:cs typeface="+mn-cs"/>
-              </a:defRPr>
-            </a:lvl3pPr>
-            <a:lvl4pPr marL="1600200" indent="-228600" algn="l" defTabSz="914400" rtl="0" eaLnBrk="1" latinLnBrk="0" hangingPunct="1">
-              <a:lnSpc>
-                <a:spcPct val="90000"/>
-              </a:lnSpc>
-              <a:spcBef>
-                <a:spcPts val="500"/>
-              </a:spcBef>
-              <a:buFont typeface="Arial" panose="020B0604020202020204" pitchFamily="34" charset="0"/>
-              <a:buChar char="•"/>
-              <a:defRPr sz="1800" kern="1200">
-                <a:solidFill>
-                  <a:schemeClr val="tx1"/>
-                </a:solidFill>
-                <a:latin typeface="+mn-lt"/>
-                <a:ea typeface="+mn-ea"/>
-                <a:cs typeface="+mn-cs"/>
-              </a:defRPr>
-            </a:lvl4pPr>
-            <a:lvl5pPr marL="2057400" indent="-228600" algn="l" defTabSz="914400" rtl="0" eaLnBrk="1" latinLnBrk="0" hangingPunct="1">
-              <a:lnSpc>
-                <a:spcPct val="90000"/>
-              </a:lnSpc>
-              <a:spcBef>
-                <a:spcPts val="500"/>
-              </a:spcBef>
-              <a:buFont typeface="Arial" panose="020B0604020202020204" pitchFamily="34" charset="0"/>
-              <a:buChar char="•"/>
-              <a:defRPr sz="1800" kern="1200">
-                <a:solidFill>
-                  <a:schemeClr val="tx1"/>
-                </a:solidFill>
-                <a:latin typeface="+mn-lt"/>
-                <a:ea typeface="+mn-ea"/>
-                <a:cs typeface="+mn-cs"/>
-              </a:defRPr>
-            </a:lvl5pPr>
-            <a:lvl6pPr marL="2514600" indent="-228600" algn="l" defTabSz="914400" rtl="0" eaLnBrk="1" latinLnBrk="0" hangingPunct="1">
-              <a:lnSpc>
-                <a:spcPct val="90000"/>
-              </a:lnSpc>
-              <a:spcBef>
-                <a:spcPts val="500"/>
-              </a:spcBef>
-              <a:buFont typeface="Arial" panose="020B0604020202020204" pitchFamily="34" charset="0"/>
-              <a:buChar char="•"/>
-              <a:defRPr sz="1800" kern="1200">
-                <a:solidFill>
-                  <a:schemeClr val="tx1"/>
-                </a:solidFill>
-                <a:latin typeface="+mn-lt"/>
-                <a:ea typeface="+mn-ea"/>
-                <a:cs typeface="+mn-cs"/>
-              </a:defRPr>
-            </a:lvl6pPr>
-            <a:lvl7pPr marL="2971800" indent="-228600" algn="l" defTabSz="914400" rtl="0" eaLnBrk="1" latinLnBrk="0" hangingPunct="1">
-              <a:lnSpc>
-                <a:spcPct val="90000"/>
-              </a:lnSpc>
-              <a:spcBef>
-                <a:spcPts val="500"/>
-              </a:spcBef>
-              <a:buFont typeface="Arial" panose="020B0604020202020204" pitchFamily="34" charset="0"/>
-              <a:buChar char="•"/>
-              <a:defRPr sz="1800" kern="1200">
-                <a:solidFill>
-                  <a:schemeClr val="tx1"/>
-                </a:solidFill>
-                <a:latin typeface="+mn-lt"/>
-                <a:ea typeface="+mn-ea"/>
-                <a:cs typeface="+mn-cs"/>
-              </a:defRPr>
-            </a:lvl7pPr>
-            <a:lvl8pPr marL="3429000" indent="-228600" algn="l" defTabSz="914400" rtl="0" eaLnBrk="1" latinLnBrk="0" hangingPunct="1">
-              <a:lnSpc>
-                <a:spcPct val="90000"/>
-              </a:lnSpc>
-              <a:spcBef>
-                <a:spcPts val="500"/>
-              </a:spcBef>
-              <a:buFont typeface="Arial" panose="020B0604020202020204" pitchFamily="34" charset="0"/>
-              <a:buChar char="•"/>
-              <a:defRPr sz="1800" kern="1200">
-                <a:solidFill>
-                  <a:schemeClr val="tx1"/>
-                </a:solidFill>
-                <a:latin typeface="+mn-lt"/>
-                <a:ea typeface="+mn-ea"/>
-                <a:cs typeface="+mn-cs"/>
-              </a:defRPr>
-            </a:lvl8pPr>
-            <a:lvl9pPr marL="3886200" indent="-228600" algn="l" defTabSz="914400" rtl="0" eaLnBrk="1" latinLnBrk="0" hangingPunct="1">
-              <a:lnSpc>
-                <a:spcPct val="90000"/>
-              </a:lnSpc>
-              <a:spcBef>
-                <a:spcPts val="500"/>
-              </a:spcBef>
-              <a:buFont typeface="Arial" panose="020B0604020202020204" pitchFamily="34" charset="0"/>
-              <a:buChar char="•"/>
-              <a:defRPr sz="1800" kern="1200">
-                <a:solidFill>
-                  <a:schemeClr val="tx1"/>
-                </a:solidFill>
-                <a:latin typeface="+mn-lt"/>
-                <a:ea typeface="+mn-ea"/>
-                <a:cs typeface="+mn-cs"/>
-              </a:defRPr>
-            </a:lvl9pPr>
-          </a:lstStyle>
-          <a:p>
-            <a:pPr marL="0" indent="0">
-              <a:buFont typeface="Arial" panose="020B0604020202020204" pitchFamily="34" charset="0"/>
-              <a:buNone/>
-            </a:pPr>
-            <a:r>
-              <a:rPr lang="tr-TR" sz="3200" b="1" u="sng">
-                <a:latin typeface="Euclid Circular B" panose="020B0504000000000000" pitchFamily="34" charset="0"/>
-                <a:ea typeface="Euclid Circular B" panose="020B0504000000000000" pitchFamily="34" charset="0"/>
-              </a:rPr>
-              <a:t>ABP COMMERCIAL</a:t>
-            </a:r>
-            <a:endParaRPr lang="en-US" sz="3200" b="1" u="sng" dirty="0">
-              <a:latin typeface="Euclid Circular B" panose="020B0504000000000000" pitchFamily="34" charset="0"/>
-              <a:ea typeface="Euclid Circular B" panose="020B0504000000000000" pitchFamily="34" charset="0"/>
-            </a:endParaRPr>
-          </a:p>
-        </p:txBody>
-      </p:sp>
+      </p:pic>
+      <p:pic>
+        <p:nvPicPr>
+          <p:cNvPr id="14" name="Picture 13" descr="Icon&#10;&#10;Description automatically generated">
+            <a:extLst>
+              <a:ext uri="{FF2B5EF4-FFF2-40B4-BE49-F238E27FC236}">
+                <a16:creationId xmlns:a16="http://schemas.microsoft.com/office/drawing/2014/main" id="{1C768944-3034-611F-5108-5AFEC8B424BE}"/>
+              </a:ext>
+            </a:extLst>
+          </p:cNvPr>
+          <p:cNvPicPr>
+            <a:picLocks noChangeAspect="1"/>
+          </p:cNvPicPr>
+          <p:nvPr/>
+        </p:nvPicPr>
+        <p:blipFill>
+          <a:blip r:embed="rId7">
+            <a:extLst>
+              <a:ext uri="{28A0092B-C50C-407E-A947-70E740481C1C}">
+                <a14:useLocalDpi xmlns:a14="http://schemas.microsoft.com/office/drawing/2010/main" val="0"/>
+              </a:ext>
+            </a:extLst>
+          </a:blip>
+          <a:stretch>
+            <a:fillRect/>
+          </a:stretch>
+        </p:blipFill>
+        <p:spPr>
+          <a:xfrm>
+            <a:off x="6402163" y="2125039"/>
+            <a:ext cx="4534293" cy="613767"/>
+          </a:xfrm>
+          <a:prstGeom prst="rect">
+            <a:avLst/>
+          </a:prstGeom>
+          <a:effectLst>
+            <a:outerShdw blurRad="50800" dist="38100" dir="2700000" algn="tl" rotWithShape="0">
+              <a:srgbClr val="7030A0">
+                <a:alpha val="40000"/>
+              </a:srgbClr>
+            </a:outerShdw>
+          </a:effectLst>
+        </p:spPr>
+      </p:pic>
     </p:spTree>
     <p:extLst>
       <p:ext uri="{BB962C8B-B14F-4D97-AF65-F5344CB8AC3E}">

</xml_diff>

<commit_message>
New empty slide: Developing with Kubernetes
</commit_message>
<xml_diff>
--- a/2023-04-16 ABP Community Talks 2023.3/What is new with ABP 7.2 RC.1.pptx
+++ b/2023-04-16 ABP Community Talks 2023.3/What is new with ABP 7.2 RC.1.pptx
@@ -4689,7 +4689,7 @@
                             </p:stCondLst>
                             <p:childTnLst>
                               <p:par>
-                                <p:cTn id="15" presetID="10" presetClass="entr" presetSubtype="0" fill="hold" nodeType="clickEffect">
+                                <p:cTn id="15" presetID="10" presetClass="entr" presetSubtype="0" fill="hold" grpId="0" nodeType="clickEffect">
                                   <p:stCondLst>
                                     <p:cond delay="0"/>
                                   </p:stCondLst>
@@ -4697,6 +4697,49 @@
                                     <p:set>
                                       <p:cBhvr>
                                         <p:cTn id="16" dur="1" fill="hold">
+                                          <p:stCondLst>
+                                            <p:cond delay="0"/>
+                                          </p:stCondLst>
+                                        </p:cTn>
+                                        <p:tgtEl>
+                                          <p:spTgt spid="3">
+                                            <p:txEl>
+                                              <p:pRg st="0" end="0"/>
+                                            </p:txEl>
+                                          </p:spTgt>
+                                        </p:tgtEl>
+                                        <p:attrNameLst>
+                                          <p:attrName>style.visibility</p:attrName>
+                                        </p:attrNameLst>
+                                      </p:cBhvr>
+                                      <p:to>
+                                        <p:strVal val="visible"/>
+                                      </p:to>
+                                    </p:set>
+                                    <p:animEffect transition="in" filter="fade">
+                                      <p:cBhvr>
+                                        <p:cTn id="17" dur="500"/>
+                                        <p:tgtEl>
+                                          <p:spTgt spid="3">
+                                            <p:txEl>
+                                              <p:pRg st="0" end="0"/>
+                                            </p:txEl>
+                                          </p:spTgt>
+                                        </p:tgtEl>
+                                      </p:cBhvr>
+                                    </p:animEffect>
+                                  </p:childTnLst>
+                                </p:cTn>
+                              </p:par>
+                              <p:par>
+                                <p:cTn id="18" presetID="10" presetClass="entr" presetSubtype="0" fill="hold" grpId="0" nodeType="withEffect">
+                                  <p:stCondLst>
+                                    <p:cond delay="0"/>
+                                  </p:stCondLst>
+                                  <p:childTnLst>
+                                    <p:set>
+                                      <p:cBhvr>
+                                        <p:cTn id="19" dur="1" fill="hold">
                                           <p:stCondLst>
                                             <p:cond delay="0"/>
                                           </p:stCondLst>
@@ -4718,7 +4761,7 @@
                                     </p:set>
                                     <p:animEffect transition="in" filter="fade">
                                       <p:cBhvr>
-                                        <p:cTn id="17" dur="500"/>
+                                        <p:cTn id="20" dur="500"/>
                                         <p:tgtEl>
                                           <p:spTgt spid="3">
                                             <p:txEl>
@@ -4731,94 +4774,15 @@
                                   </p:childTnLst>
                                 </p:cTn>
                               </p:par>
-                            </p:childTnLst>
-                          </p:cTn>
-                        </p:par>
-                      </p:childTnLst>
-                    </p:cTn>
-                  </p:par>
-                  <p:par>
-                    <p:cTn id="18" fill="hold">
-                      <p:stCondLst>
-                        <p:cond delay="indefinite"/>
-                      </p:stCondLst>
-                      <p:childTnLst>
-                        <p:par>
-                          <p:cTn id="19" fill="hold">
-                            <p:stCondLst>
-                              <p:cond delay="0"/>
-                            </p:stCondLst>
-                            <p:childTnLst>
                               <p:par>
-                                <p:cTn id="20" presetID="10" presetClass="entr" presetSubtype="0" fill="hold" nodeType="clickEffect">
+                                <p:cTn id="21" presetID="10" presetClass="entr" presetSubtype="0" fill="hold" grpId="0" nodeType="withEffect">
                                   <p:stCondLst>
                                     <p:cond delay="0"/>
                                   </p:stCondLst>
                                   <p:childTnLst>
                                     <p:set>
                                       <p:cBhvr>
-                                        <p:cTn id="21" dur="1" fill="hold">
-                                          <p:stCondLst>
-                                            <p:cond delay="0"/>
-                                          </p:stCondLst>
-                                        </p:cTn>
-                                        <p:tgtEl>
-                                          <p:spTgt spid="3">
-                                            <p:txEl>
-                                              <p:pRg st="0" end="0"/>
-                                            </p:txEl>
-                                          </p:spTgt>
-                                        </p:tgtEl>
-                                        <p:attrNameLst>
-                                          <p:attrName>style.visibility</p:attrName>
-                                        </p:attrNameLst>
-                                      </p:cBhvr>
-                                      <p:to>
-                                        <p:strVal val="visible"/>
-                                      </p:to>
-                                    </p:set>
-                                    <p:animEffect transition="in" filter="fade">
-                                      <p:cBhvr>
-                                        <p:cTn id="22" dur="500"/>
-                                        <p:tgtEl>
-                                          <p:spTgt spid="3">
-                                            <p:txEl>
-                                              <p:pRg st="0" end="0"/>
-                                            </p:txEl>
-                                          </p:spTgt>
-                                        </p:tgtEl>
-                                      </p:cBhvr>
-                                    </p:animEffect>
-                                  </p:childTnLst>
-                                </p:cTn>
-                              </p:par>
-                            </p:childTnLst>
-                          </p:cTn>
-                        </p:par>
-                      </p:childTnLst>
-                    </p:cTn>
-                  </p:par>
-                  <p:par>
-                    <p:cTn id="23" fill="hold">
-                      <p:stCondLst>
-                        <p:cond delay="indefinite"/>
-                      </p:stCondLst>
-                      <p:childTnLst>
-                        <p:par>
-                          <p:cTn id="24" fill="hold">
-                            <p:stCondLst>
-                              <p:cond delay="0"/>
-                            </p:stCondLst>
-                            <p:childTnLst>
-                              <p:par>
-                                <p:cTn id="25" presetID="10" presetClass="entr" presetSubtype="0" fill="hold" nodeType="clickEffect">
-                                  <p:stCondLst>
-                                    <p:cond delay="0"/>
-                                  </p:stCondLst>
-                                  <p:childTnLst>
-                                    <p:set>
-                                      <p:cBhvr>
-                                        <p:cTn id="26" dur="1" fill="hold">
+                                        <p:cTn id="22" dur="1" fill="hold">
                                           <p:stCondLst>
                                             <p:cond delay="0"/>
                                           </p:stCondLst>
@@ -4840,7 +4804,7 @@
                                     </p:set>
                                     <p:animEffect transition="in" filter="fade">
                                       <p:cBhvr>
-                                        <p:cTn id="27" dur="500"/>
+                                        <p:cTn id="23" dur="500"/>
                                         <p:tgtEl>
                                           <p:spTgt spid="3">
                                             <p:txEl>
@@ -4853,33 +4817,15 @@
                                   </p:childTnLst>
                                 </p:cTn>
                               </p:par>
-                            </p:childTnLst>
-                          </p:cTn>
-                        </p:par>
-                      </p:childTnLst>
-                    </p:cTn>
-                  </p:par>
-                  <p:par>
-                    <p:cTn id="28" fill="hold">
-                      <p:stCondLst>
-                        <p:cond delay="indefinite"/>
-                      </p:stCondLst>
-                      <p:childTnLst>
-                        <p:par>
-                          <p:cTn id="29" fill="hold">
-                            <p:stCondLst>
-                              <p:cond delay="0"/>
-                            </p:stCondLst>
-                            <p:childTnLst>
                               <p:par>
-                                <p:cTn id="30" presetID="10" presetClass="entr" presetSubtype="0" fill="hold" nodeType="clickEffect">
+                                <p:cTn id="24" presetID="10" presetClass="entr" presetSubtype="0" fill="hold" grpId="0" nodeType="withEffect">
                                   <p:stCondLst>
                                     <p:cond delay="0"/>
                                   </p:stCondLst>
                                   <p:childTnLst>
                                     <p:set>
                                       <p:cBhvr>
-                                        <p:cTn id="31" dur="1" fill="hold">
+                                        <p:cTn id="25" dur="1" fill="hold">
                                           <p:stCondLst>
                                             <p:cond delay="0"/>
                                           </p:stCondLst>
@@ -4901,7 +4847,7 @@
                                     </p:set>
                                     <p:animEffect transition="in" filter="fade">
                                       <p:cBhvr>
-                                        <p:cTn id="32" dur="500"/>
+                                        <p:cTn id="26" dur="500"/>
                                         <p:tgtEl>
                                           <p:spTgt spid="3">
                                             <p:txEl>
@@ -4941,6 +4887,9 @@
         </p:cTn>
       </p:par>
     </p:tnLst>
+    <p:bldLst>
+      <p:bldP spid="3" grpId="0" uiExpand="1" build="p"/>
+    </p:bldLst>
   </p:timing>
 </p:sld>
 </file>

</xml_diff>